<commit_message>
Update Présentation Projet P_APP Webstore.pptx
</commit_message>
<xml_diff>
--- a/Documentation/Présentation Projet P_APP Webstore.pptx
+++ b/Documentation/Présentation Projet P_APP Webstore.pptx
@@ -12,6 +12,8 @@
     <p:sldId id="260" r:id="rId6"/>
     <p:sldId id="261" r:id="rId7"/>
     <p:sldId id="262" r:id="rId8"/>
+    <p:sldId id="263" r:id="rId9"/>
+    <p:sldId id="264" r:id="rId10"/>
   </p:sldIdLst>
   <p:sldSz cx="12192000" cy="6858000"/>
   <p:notesSz cx="6858000" cy="9144000"/>
@@ -110,6 +112,11 @@
       </a:defRPr>
     </a:lvl9pPr>
   </p:defaultTextStyle>
+  <p:extLst>
+    <p:ext uri="{EFAFB233-063F-42B5-8137-9DF3F51BA10A}">
+      <p15:sldGuideLst xmlns:p15="http://schemas.microsoft.com/office/powerpoint/2012/main"/>
+    </p:ext>
+  </p:extLst>
 </p:presentation>
 </file>
 
@@ -7733,6 +7740,206 @@
           </a:p>
         </p:txBody>
       </p:sp>
+      <p:sp>
+        <p:nvSpPr>
+          <p:cNvPr id="4" name="Sous-titre 2">
+            <a:extLst>
+              <a:ext uri="{FF2B5EF4-FFF2-40B4-BE49-F238E27FC236}">
+                <a16:creationId xmlns:a16="http://schemas.microsoft.com/office/drawing/2014/main" id="{650DCE02-65A0-261B-1ECC-5D16A7514B18}"/>
+              </a:ext>
+            </a:extLst>
+          </p:cNvPr>
+          <p:cNvSpPr txBox="1">
+            <a:spLocks/>
+          </p:cNvSpPr>
+          <p:nvPr/>
+        </p:nvSpPr>
+        <p:spPr>
+          <a:xfrm>
+            <a:off x="9096399" y="6576442"/>
+            <a:ext cx="3095601" cy="281558"/>
+          </a:xfrm>
+          <a:prstGeom prst="rect">
+            <a:avLst/>
+          </a:prstGeom>
+        </p:spPr>
+        <p:txBody>
+          <a:bodyPr vert="horz" lIns="91440" tIns="45720" rIns="91440" bIns="45720" rtlCol="0">
+            <a:normAutofit fontScale="85000" lnSpcReduction="20000"/>
+          </a:bodyPr>
+          <a:lstStyle>
+            <a:lvl1pPr marL="0" indent="0" algn="r" defTabSz="914400" rtl="0" eaLnBrk="1" latinLnBrk="0" hangingPunct="1">
+              <a:lnSpc>
+                <a:spcPct val="90000"/>
+              </a:lnSpc>
+              <a:spcBef>
+                <a:spcPts val="1000"/>
+              </a:spcBef>
+              <a:buFont typeface="Arial" panose="020B0604020202020204" pitchFamily="34" charset="0"/>
+              <a:buNone/>
+              <a:defRPr sz="2000" kern="1200">
+                <a:solidFill>
+                  <a:schemeClr val="tx1"/>
+                </a:solidFill>
+                <a:latin typeface="+mn-lt"/>
+                <a:ea typeface="+mn-ea"/>
+                <a:cs typeface="+mn-cs"/>
+              </a:defRPr>
+            </a:lvl1pPr>
+            <a:lvl2pPr marL="457200" indent="0" algn="ctr" defTabSz="914400" rtl="0" eaLnBrk="1" latinLnBrk="0" hangingPunct="1">
+              <a:lnSpc>
+                <a:spcPct val="90000"/>
+              </a:lnSpc>
+              <a:spcBef>
+                <a:spcPts val="500"/>
+              </a:spcBef>
+              <a:buFont typeface="Arial" panose="020B0604020202020204" pitchFamily="34" charset="0"/>
+              <a:buNone/>
+              <a:defRPr sz="2000" kern="1200">
+                <a:solidFill>
+                  <a:schemeClr val="tx1"/>
+                </a:solidFill>
+                <a:latin typeface="+mn-lt"/>
+                <a:ea typeface="+mn-ea"/>
+                <a:cs typeface="+mn-cs"/>
+              </a:defRPr>
+            </a:lvl2pPr>
+            <a:lvl3pPr marL="914400" indent="0" algn="ctr" defTabSz="914400" rtl="0" eaLnBrk="1" latinLnBrk="0" hangingPunct="1">
+              <a:lnSpc>
+                <a:spcPct val="90000"/>
+              </a:lnSpc>
+              <a:spcBef>
+                <a:spcPts val="500"/>
+              </a:spcBef>
+              <a:buFont typeface="Arial" panose="020B0604020202020204" pitchFamily="34" charset="0"/>
+              <a:buNone/>
+              <a:defRPr sz="1800" kern="1200">
+                <a:solidFill>
+                  <a:schemeClr val="tx1"/>
+                </a:solidFill>
+                <a:latin typeface="+mn-lt"/>
+                <a:ea typeface="+mn-ea"/>
+                <a:cs typeface="+mn-cs"/>
+              </a:defRPr>
+            </a:lvl3pPr>
+            <a:lvl4pPr marL="1371600" indent="0" algn="ctr" defTabSz="914400" rtl="0" eaLnBrk="1" latinLnBrk="0" hangingPunct="1">
+              <a:lnSpc>
+                <a:spcPct val="90000"/>
+              </a:lnSpc>
+              <a:spcBef>
+                <a:spcPts val="500"/>
+              </a:spcBef>
+              <a:buFont typeface="Arial" panose="020B0604020202020204" pitchFamily="34" charset="0"/>
+              <a:buNone/>
+              <a:defRPr sz="1600" kern="1200">
+                <a:solidFill>
+                  <a:schemeClr val="tx1"/>
+                </a:solidFill>
+                <a:latin typeface="+mn-lt"/>
+                <a:ea typeface="+mn-ea"/>
+                <a:cs typeface="+mn-cs"/>
+              </a:defRPr>
+            </a:lvl4pPr>
+            <a:lvl5pPr marL="1828800" indent="0" algn="ctr" defTabSz="914400" rtl="0" eaLnBrk="1" latinLnBrk="0" hangingPunct="1">
+              <a:lnSpc>
+                <a:spcPct val="90000"/>
+              </a:lnSpc>
+              <a:spcBef>
+                <a:spcPts val="500"/>
+              </a:spcBef>
+              <a:buFont typeface="Arial" panose="020B0604020202020204" pitchFamily="34" charset="0"/>
+              <a:buNone/>
+              <a:defRPr sz="1600" kern="1200">
+                <a:solidFill>
+                  <a:schemeClr val="tx1"/>
+                </a:solidFill>
+                <a:latin typeface="+mn-lt"/>
+                <a:ea typeface="+mn-ea"/>
+                <a:cs typeface="+mn-cs"/>
+              </a:defRPr>
+            </a:lvl5pPr>
+            <a:lvl6pPr marL="2286000" indent="0" algn="ctr" defTabSz="914400" rtl="0" eaLnBrk="1" latinLnBrk="0" hangingPunct="1">
+              <a:lnSpc>
+                <a:spcPct val="90000"/>
+              </a:lnSpc>
+              <a:spcBef>
+                <a:spcPts val="500"/>
+              </a:spcBef>
+              <a:buFont typeface="Arial" panose="020B0604020202020204" pitchFamily="34" charset="0"/>
+              <a:buNone/>
+              <a:defRPr sz="1600" kern="1200">
+                <a:solidFill>
+                  <a:schemeClr val="tx1"/>
+                </a:solidFill>
+                <a:latin typeface="+mn-lt"/>
+                <a:ea typeface="+mn-ea"/>
+                <a:cs typeface="+mn-cs"/>
+              </a:defRPr>
+            </a:lvl6pPr>
+            <a:lvl7pPr marL="2743200" indent="0" algn="ctr" defTabSz="914400" rtl="0" eaLnBrk="1" latinLnBrk="0" hangingPunct="1">
+              <a:lnSpc>
+                <a:spcPct val="90000"/>
+              </a:lnSpc>
+              <a:spcBef>
+                <a:spcPts val="500"/>
+              </a:spcBef>
+              <a:buFont typeface="Arial" panose="020B0604020202020204" pitchFamily="34" charset="0"/>
+              <a:buNone/>
+              <a:defRPr sz="1600" kern="1200">
+                <a:solidFill>
+                  <a:schemeClr val="tx1"/>
+                </a:solidFill>
+                <a:latin typeface="+mn-lt"/>
+                <a:ea typeface="+mn-ea"/>
+                <a:cs typeface="+mn-cs"/>
+              </a:defRPr>
+            </a:lvl7pPr>
+            <a:lvl8pPr marL="3200400" indent="0" algn="ctr" defTabSz="914400" rtl="0" eaLnBrk="1" latinLnBrk="0" hangingPunct="1">
+              <a:lnSpc>
+                <a:spcPct val="90000"/>
+              </a:lnSpc>
+              <a:spcBef>
+                <a:spcPts val="500"/>
+              </a:spcBef>
+              <a:buFont typeface="Arial" panose="020B0604020202020204" pitchFamily="34" charset="0"/>
+              <a:buNone/>
+              <a:defRPr sz="1600" kern="1200">
+                <a:solidFill>
+                  <a:schemeClr val="tx1"/>
+                </a:solidFill>
+                <a:latin typeface="+mn-lt"/>
+                <a:ea typeface="+mn-ea"/>
+                <a:cs typeface="+mn-cs"/>
+              </a:defRPr>
+            </a:lvl8pPr>
+            <a:lvl9pPr marL="3657600" indent="0" algn="ctr" defTabSz="914400" rtl="0" eaLnBrk="1" latinLnBrk="0" hangingPunct="1">
+              <a:lnSpc>
+                <a:spcPct val="90000"/>
+              </a:lnSpc>
+              <a:spcBef>
+                <a:spcPts val="500"/>
+              </a:spcBef>
+              <a:buFont typeface="Arial" panose="020B0604020202020204" pitchFamily="34" charset="0"/>
+              <a:buNone/>
+              <a:defRPr sz="1600" kern="1200">
+                <a:solidFill>
+                  <a:schemeClr val="tx1"/>
+                </a:solidFill>
+                <a:latin typeface="+mn-lt"/>
+                <a:ea typeface="+mn-ea"/>
+                <a:cs typeface="+mn-cs"/>
+              </a:defRPr>
+            </a:lvl9pPr>
+          </a:lstStyle>
+          <a:p>
+            <a:pPr algn="l"/>
+            <a:r>
+              <a:rPr lang="fr-CH" dirty="0"/>
+              <a:t>Thibaud Racine - Module i183 </a:t>
+            </a:r>
+          </a:p>
+        </p:txBody>
+      </p:sp>
     </p:spTree>
     <p:extLst>
       <p:ext uri="{BB962C8B-B14F-4D97-AF65-F5344CB8AC3E}">
@@ -8501,7 +8708,18 @@
           <a:bodyPr/>
           <a:lstStyle/>
           <a:p>
-            <a:endParaRPr lang="fr-CH"/>
+            <a:r>
+              <a:rPr lang="fr-CH" dirty="0"/>
+              <a:t>Mot de Passe </a:t>
+            </a:r>
+            <a:r>
+              <a:rPr lang="fr-CH" dirty="0" err="1"/>
+              <a:t>hashé</a:t>
+            </a:r>
+            <a:r>
+              <a:rPr lang="fr-CH" dirty="0"/>
+              <a:t> et DB</a:t>
+            </a:r>
           </a:p>
         </p:txBody>
       </p:sp>
@@ -8533,15 +8751,21 @@
           <a:p>
             <a:r>
               <a:rPr lang="fr-CH" dirty="0"/>
-              <a:t>Un </a:t>
-            </a:r>
-            <a:r>
-              <a:rPr lang="fr-CH"/>
-              <a:t>utilisateur est créé </a:t>
-            </a:r>
+              <a:t>Un utilisateur est créé et inséré dans la DB</a:t>
+            </a:r>
+          </a:p>
+          <a:p>
             <a:r>
               <a:rPr lang="fr-CH" dirty="0"/>
-              <a:t>et inséré dans la DB</a:t>
+              <a:t>Mot de passe </a:t>
+            </a:r>
+            <a:r>
+              <a:rPr lang="fr-CH" dirty="0" err="1"/>
+              <a:t>Hashé</a:t>
+            </a:r>
+            <a:r>
+              <a:rPr lang="fr-CH" dirty="0"/>
+              <a:t> dans la DB</a:t>
             </a:r>
           </a:p>
         </p:txBody>
@@ -8576,10 +8800,644 @@
           </a:prstGeom>
         </p:spPr>
       </p:pic>
+      <p:pic>
+        <p:nvPicPr>
+          <p:cNvPr id="8" name="Image 7">
+            <a:extLst>
+              <a:ext uri="{FF2B5EF4-FFF2-40B4-BE49-F238E27FC236}">
+                <a16:creationId xmlns:a16="http://schemas.microsoft.com/office/drawing/2014/main" id="{F30EF38B-5C9F-3798-F436-5D8EA57DB8A3}"/>
+              </a:ext>
+            </a:extLst>
+          </p:cNvPr>
+          <p:cNvPicPr>
+            <a:picLocks noChangeAspect="1"/>
+          </p:cNvPicPr>
+          <p:nvPr/>
+        </p:nvPicPr>
+        <p:blipFill>
+          <a:blip r:embed="rId3"/>
+          <a:stretch>
+            <a:fillRect/>
+          </a:stretch>
+        </p:blipFill>
+        <p:spPr>
+          <a:xfrm>
+            <a:off x="599348" y="6086560"/>
+            <a:ext cx="6809524" cy="676190"/>
+          </a:xfrm>
+          <a:prstGeom prst="rect">
+            <a:avLst/>
+          </a:prstGeom>
+        </p:spPr>
+      </p:pic>
     </p:spTree>
     <p:extLst>
       <p:ext uri="{BB962C8B-B14F-4D97-AF65-F5344CB8AC3E}">
         <p14:creationId xmlns:p14="http://schemas.microsoft.com/office/powerpoint/2010/main" val="224867398"/>
+      </p:ext>
+    </p:extLst>
+  </p:cSld>
+  <p:clrMapOvr>
+    <a:masterClrMapping/>
+  </p:clrMapOvr>
+</p:sld>
+</file>
+
+<file path=ppt/slides/slide8.xml><?xml version="1.0" encoding="utf-8"?>
+<p:sld xmlns:a="http://schemas.openxmlformats.org/drawingml/2006/main" xmlns:r="http://schemas.openxmlformats.org/officeDocument/2006/relationships" xmlns:p="http://schemas.openxmlformats.org/presentationml/2006/main">
+  <p:cSld>
+    <p:spTree>
+      <p:nvGrpSpPr>
+        <p:cNvPr id="1" name=""/>
+        <p:cNvGrpSpPr/>
+        <p:nvPr/>
+      </p:nvGrpSpPr>
+      <p:grpSpPr>
+        <a:xfrm>
+          <a:off x="0" y="0"/>
+          <a:ext cx="0" cy="0"/>
+          <a:chOff x="0" y="0"/>
+          <a:chExt cx="0" cy="0"/>
+        </a:xfrm>
+      </p:grpSpPr>
+      <p:sp>
+        <p:nvSpPr>
+          <p:cNvPr id="2" name="Titre 1">
+            <a:extLst>
+              <a:ext uri="{FF2B5EF4-FFF2-40B4-BE49-F238E27FC236}">
+                <a16:creationId xmlns:a16="http://schemas.microsoft.com/office/drawing/2014/main" id="{01963E05-09CB-FCC9-4CE6-DC7905B0DAAA}"/>
+              </a:ext>
+            </a:extLst>
+          </p:cNvPr>
+          <p:cNvSpPr>
+            <a:spLocks noGrp="1"/>
+          </p:cNvSpPr>
+          <p:nvPr>
+            <p:ph type="title"/>
+          </p:nvPr>
+        </p:nvSpPr>
+        <p:spPr/>
+        <p:txBody>
+          <a:bodyPr/>
+          <a:lstStyle/>
+          <a:p>
+            <a:r>
+              <a:rPr lang="fr-CH" dirty="0"/>
+              <a:t>Page de Login</a:t>
+            </a:r>
+          </a:p>
+        </p:txBody>
+      </p:sp>
+      <p:pic>
+        <p:nvPicPr>
+          <p:cNvPr id="5" name="Espace réservé du contenu 4" descr="Une image contenant texte, capture d’écran, Police&#10;&#10;Description générée automatiquement">
+            <a:extLst>
+              <a:ext uri="{FF2B5EF4-FFF2-40B4-BE49-F238E27FC236}">
+                <a16:creationId xmlns:a16="http://schemas.microsoft.com/office/drawing/2014/main" id="{FE7238A5-B6E4-12DE-7301-60BC5BCD5347}"/>
+              </a:ext>
+            </a:extLst>
+          </p:cNvPr>
+          <p:cNvPicPr>
+            <a:picLocks noGrp="1" noChangeAspect="1"/>
+          </p:cNvPicPr>
+          <p:nvPr>
+            <p:ph idx="1"/>
+          </p:nvPr>
+        </p:nvPicPr>
+        <p:blipFill>
+          <a:blip r:embed="rId2"/>
+          <a:stretch>
+            <a:fillRect/>
+          </a:stretch>
+        </p:blipFill>
+        <p:spPr>
+          <a:xfrm>
+            <a:off x="8010769" y="4940399"/>
+            <a:ext cx="3991532" cy="1200318"/>
+          </a:xfrm>
+        </p:spPr>
+      </p:pic>
+      <p:pic>
+        <p:nvPicPr>
+          <p:cNvPr id="7" name="Image 6" descr="Une image contenant texte, capture d’écran, Police&#10;&#10;Description générée automatiquement">
+            <a:extLst>
+              <a:ext uri="{FF2B5EF4-FFF2-40B4-BE49-F238E27FC236}">
+                <a16:creationId xmlns:a16="http://schemas.microsoft.com/office/drawing/2014/main" id="{79958C94-81AA-9850-20D6-F6DB5F63C390}"/>
+              </a:ext>
+            </a:extLst>
+          </p:cNvPr>
+          <p:cNvPicPr>
+            <a:picLocks noChangeAspect="1"/>
+          </p:cNvPicPr>
+          <p:nvPr/>
+        </p:nvPicPr>
+        <p:blipFill>
+          <a:blip r:embed="rId3"/>
+          <a:stretch>
+            <a:fillRect/>
+          </a:stretch>
+        </p:blipFill>
+        <p:spPr>
+          <a:xfrm>
+            <a:off x="7740850" y="3568149"/>
+            <a:ext cx="4261451" cy="1233101"/>
+          </a:xfrm>
+          <a:prstGeom prst="rect">
+            <a:avLst/>
+          </a:prstGeom>
+        </p:spPr>
+      </p:pic>
+      <p:pic>
+        <p:nvPicPr>
+          <p:cNvPr id="9" name="Image 8" descr="Une image contenant texte, capture d’écran, ligne, blanc&#10;&#10;Description générée automatiquement">
+            <a:extLst>
+              <a:ext uri="{FF2B5EF4-FFF2-40B4-BE49-F238E27FC236}">
+                <a16:creationId xmlns:a16="http://schemas.microsoft.com/office/drawing/2014/main" id="{BC5817DE-6BF1-6190-BE8D-1227FEF4C1A0}"/>
+              </a:ext>
+            </a:extLst>
+          </p:cNvPr>
+          <p:cNvPicPr>
+            <a:picLocks noChangeAspect="1"/>
+          </p:cNvPicPr>
+          <p:nvPr/>
+        </p:nvPicPr>
+        <p:blipFill>
+          <a:blip r:embed="rId4"/>
+          <a:stretch>
+            <a:fillRect/>
+          </a:stretch>
+        </p:blipFill>
+        <p:spPr>
+          <a:xfrm>
+            <a:off x="6715188" y="2114367"/>
+            <a:ext cx="5287113" cy="1314633"/>
+          </a:xfrm>
+          <a:prstGeom prst="rect">
+            <a:avLst/>
+          </a:prstGeom>
+        </p:spPr>
+      </p:pic>
+      <p:sp>
+        <p:nvSpPr>
+          <p:cNvPr id="10" name="Espace réservé du contenu 2">
+            <a:extLst>
+              <a:ext uri="{FF2B5EF4-FFF2-40B4-BE49-F238E27FC236}">
+                <a16:creationId xmlns:a16="http://schemas.microsoft.com/office/drawing/2014/main" id="{79BECE3F-E34D-5EB7-8F21-6BD43076CCD9}"/>
+              </a:ext>
+            </a:extLst>
+          </p:cNvPr>
+          <p:cNvSpPr txBox="1">
+            <a:spLocks/>
+          </p:cNvSpPr>
+          <p:nvPr/>
+        </p:nvSpPr>
+        <p:spPr>
+          <a:xfrm>
+            <a:off x="405246" y="2336873"/>
+            <a:ext cx="6234546" cy="3599316"/>
+          </a:xfrm>
+          <a:prstGeom prst="rect">
+            <a:avLst/>
+          </a:prstGeom>
+        </p:spPr>
+        <p:txBody>
+          <a:bodyPr vert="horz" lIns="91440" tIns="45720" rIns="91440" bIns="45720" rtlCol="0">
+            <a:normAutofit/>
+          </a:bodyPr>
+          <a:lstStyle>
+            <a:lvl1pPr marL="228600" indent="-228600" algn="l" defTabSz="914400" rtl="0" eaLnBrk="1" latinLnBrk="0" hangingPunct="1">
+              <a:lnSpc>
+                <a:spcPct val="90000"/>
+              </a:lnSpc>
+              <a:spcBef>
+                <a:spcPts val="1000"/>
+              </a:spcBef>
+              <a:buFont typeface="Arial" panose="020B0604020202020204" pitchFamily="34" charset="0"/>
+              <a:buChar char="•"/>
+              <a:defRPr sz="2400" kern="1200">
+                <a:solidFill>
+                  <a:schemeClr val="tx1"/>
+                </a:solidFill>
+                <a:latin typeface="+mn-lt"/>
+                <a:ea typeface="+mn-ea"/>
+                <a:cs typeface="+mn-cs"/>
+              </a:defRPr>
+            </a:lvl1pPr>
+            <a:lvl2pPr marL="685800" indent="-228600" algn="l" defTabSz="914400" rtl="0" eaLnBrk="1" latinLnBrk="0" hangingPunct="1">
+              <a:lnSpc>
+                <a:spcPct val="90000"/>
+              </a:lnSpc>
+              <a:spcBef>
+                <a:spcPts val="500"/>
+              </a:spcBef>
+              <a:buFont typeface="Arial" panose="020B0604020202020204" pitchFamily="34" charset="0"/>
+              <a:buChar char="•"/>
+              <a:defRPr sz="2000" kern="1200">
+                <a:solidFill>
+                  <a:schemeClr val="tx1"/>
+                </a:solidFill>
+                <a:latin typeface="+mn-lt"/>
+                <a:ea typeface="+mn-ea"/>
+                <a:cs typeface="+mn-cs"/>
+              </a:defRPr>
+            </a:lvl2pPr>
+            <a:lvl3pPr marL="1143000" indent="-228600" algn="l" defTabSz="914400" rtl="0" eaLnBrk="1" latinLnBrk="0" hangingPunct="1">
+              <a:lnSpc>
+                <a:spcPct val="90000"/>
+              </a:lnSpc>
+              <a:spcBef>
+                <a:spcPts val="500"/>
+              </a:spcBef>
+              <a:buFont typeface="Arial" panose="020B0604020202020204" pitchFamily="34" charset="0"/>
+              <a:buChar char="•"/>
+              <a:defRPr sz="1800" kern="1200">
+                <a:solidFill>
+                  <a:schemeClr val="tx1"/>
+                </a:solidFill>
+                <a:latin typeface="+mn-lt"/>
+                <a:ea typeface="+mn-ea"/>
+                <a:cs typeface="+mn-cs"/>
+              </a:defRPr>
+            </a:lvl3pPr>
+            <a:lvl4pPr marL="1600200" indent="-228600" algn="l" defTabSz="914400" rtl="0" eaLnBrk="1" latinLnBrk="0" hangingPunct="1">
+              <a:lnSpc>
+                <a:spcPct val="90000"/>
+              </a:lnSpc>
+              <a:spcBef>
+                <a:spcPts val="500"/>
+              </a:spcBef>
+              <a:buFont typeface="Arial" panose="020B0604020202020204" pitchFamily="34" charset="0"/>
+              <a:buChar char="•"/>
+              <a:defRPr sz="1600" kern="1200">
+                <a:solidFill>
+                  <a:schemeClr val="tx1"/>
+                </a:solidFill>
+                <a:latin typeface="+mn-lt"/>
+                <a:ea typeface="+mn-ea"/>
+                <a:cs typeface="+mn-cs"/>
+              </a:defRPr>
+            </a:lvl4pPr>
+            <a:lvl5pPr marL="2057400" indent="-228600" algn="l" defTabSz="914400" rtl="0" eaLnBrk="1" latinLnBrk="0" hangingPunct="1">
+              <a:lnSpc>
+                <a:spcPct val="90000"/>
+              </a:lnSpc>
+              <a:spcBef>
+                <a:spcPts val="500"/>
+              </a:spcBef>
+              <a:buFont typeface="Arial" panose="020B0604020202020204" pitchFamily="34" charset="0"/>
+              <a:buChar char="•"/>
+              <a:defRPr sz="1600" kern="1200">
+                <a:solidFill>
+                  <a:schemeClr val="tx1"/>
+                </a:solidFill>
+                <a:latin typeface="+mn-lt"/>
+                <a:ea typeface="+mn-ea"/>
+                <a:cs typeface="+mn-cs"/>
+              </a:defRPr>
+            </a:lvl5pPr>
+            <a:lvl6pPr marL="2514600" indent="-228600" algn="l" defTabSz="914400" rtl="0" eaLnBrk="1" latinLnBrk="0" hangingPunct="1">
+              <a:lnSpc>
+                <a:spcPct val="90000"/>
+              </a:lnSpc>
+              <a:spcBef>
+                <a:spcPts val="500"/>
+              </a:spcBef>
+              <a:buFont typeface="Arial" panose="020B0604020202020204" pitchFamily="34" charset="0"/>
+              <a:buChar char="•"/>
+              <a:defRPr sz="1400" kern="1200">
+                <a:solidFill>
+                  <a:schemeClr val="tx1"/>
+                </a:solidFill>
+                <a:latin typeface="+mn-lt"/>
+                <a:ea typeface="+mn-ea"/>
+                <a:cs typeface="+mn-cs"/>
+              </a:defRPr>
+            </a:lvl6pPr>
+            <a:lvl7pPr marL="2971800" indent="-228600" algn="l" defTabSz="914400" rtl="0" eaLnBrk="1" latinLnBrk="0" hangingPunct="1">
+              <a:lnSpc>
+                <a:spcPct val="90000"/>
+              </a:lnSpc>
+              <a:spcBef>
+                <a:spcPts val="500"/>
+              </a:spcBef>
+              <a:buFont typeface="Arial" panose="020B0604020202020204" pitchFamily="34" charset="0"/>
+              <a:buChar char="•"/>
+              <a:defRPr sz="1400" kern="1200">
+                <a:solidFill>
+                  <a:schemeClr val="tx1"/>
+                </a:solidFill>
+                <a:latin typeface="+mn-lt"/>
+                <a:ea typeface="+mn-ea"/>
+                <a:cs typeface="+mn-cs"/>
+              </a:defRPr>
+            </a:lvl7pPr>
+            <a:lvl8pPr marL="3429000" indent="-228600" algn="l" defTabSz="914400" rtl="0" eaLnBrk="1" latinLnBrk="0" hangingPunct="1">
+              <a:lnSpc>
+                <a:spcPct val="90000"/>
+              </a:lnSpc>
+              <a:spcBef>
+                <a:spcPts val="500"/>
+              </a:spcBef>
+              <a:buFont typeface="Arial" panose="020B0604020202020204" pitchFamily="34" charset="0"/>
+              <a:buChar char="•"/>
+              <a:defRPr sz="1400" kern="1200">
+                <a:solidFill>
+                  <a:schemeClr val="tx1"/>
+                </a:solidFill>
+                <a:latin typeface="+mn-lt"/>
+                <a:ea typeface="+mn-ea"/>
+                <a:cs typeface="+mn-cs"/>
+              </a:defRPr>
+            </a:lvl8pPr>
+            <a:lvl9pPr marL="3886200" indent="-228600" algn="l" defTabSz="914400" rtl="0" eaLnBrk="1" latinLnBrk="0" hangingPunct="1">
+              <a:lnSpc>
+                <a:spcPct val="90000"/>
+              </a:lnSpc>
+              <a:spcBef>
+                <a:spcPts val="500"/>
+              </a:spcBef>
+              <a:buFont typeface="Arial" panose="020B0604020202020204" pitchFamily="34" charset="0"/>
+              <a:buChar char="•"/>
+              <a:defRPr sz="1400" kern="1200">
+                <a:solidFill>
+                  <a:schemeClr val="tx1"/>
+                </a:solidFill>
+                <a:latin typeface="+mn-lt"/>
+                <a:ea typeface="+mn-ea"/>
+                <a:cs typeface="+mn-cs"/>
+              </a:defRPr>
+            </a:lvl9pPr>
+          </a:lstStyle>
+          <a:p>
+            <a:r>
+              <a:rPr lang="fr-CH" dirty="0"/>
+              <a:t>Intrusion sur un autre profil impossible</a:t>
+            </a:r>
+          </a:p>
+        </p:txBody>
+      </p:sp>
+    </p:spTree>
+    <p:extLst>
+      <p:ext uri="{BB962C8B-B14F-4D97-AF65-F5344CB8AC3E}">
+        <p14:creationId xmlns:p14="http://schemas.microsoft.com/office/powerpoint/2010/main" val="4267450958"/>
+      </p:ext>
+    </p:extLst>
+  </p:cSld>
+  <p:clrMapOvr>
+    <a:masterClrMapping/>
+  </p:clrMapOvr>
+</p:sld>
+</file>
+
+<file path=ppt/slides/slide9.xml><?xml version="1.0" encoding="utf-8"?>
+<p:sld xmlns:a="http://schemas.openxmlformats.org/drawingml/2006/main" xmlns:r="http://schemas.openxmlformats.org/officeDocument/2006/relationships" xmlns:p="http://schemas.openxmlformats.org/presentationml/2006/main">
+  <p:cSld>
+    <p:spTree>
+      <p:nvGrpSpPr>
+        <p:cNvPr id="1" name=""/>
+        <p:cNvGrpSpPr/>
+        <p:nvPr/>
+      </p:nvGrpSpPr>
+      <p:grpSpPr>
+        <a:xfrm>
+          <a:off x="0" y="0"/>
+          <a:ext cx="0" cy="0"/>
+          <a:chOff x="0" y="0"/>
+          <a:chExt cx="0" cy="0"/>
+        </a:xfrm>
+      </p:grpSpPr>
+      <p:sp>
+        <p:nvSpPr>
+          <p:cNvPr id="2" name="Titre 1">
+            <a:extLst>
+              <a:ext uri="{FF2B5EF4-FFF2-40B4-BE49-F238E27FC236}">
+                <a16:creationId xmlns:a16="http://schemas.microsoft.com/office/drawing/2014/main" id="{E52D4852-E335-5EE6-4D1D-DA41AEE41C3E}"/>
+              </a:ext>
+            </a:extLst>
+          </p:cNvPr>
+          <p:cNvSpPr>
+            <a:spLocks noGrp="1"/>
+          </p:cNvSpPr>
+          <p:nvPr>
+            <p:ph type="title"/>
+          </p:nvPr>
+        </p:nvSpPr>
+        <p:spPr/>
+        <p:txBody>
+          <a:bodyPr/>
+          <a:lstStyle/>
+          <a:p>
+            <a:r>
+              <a:rPr lang="fr-CH" dirty="0"/>
+              <a:t>Conclusion &amp; Questions</a:t>
+            </a:r>
+          </a:p>
+        </p:txBody>
+      </p:sp>
+      <p:sp>
+        <p:nvSpPr>
+          <p:cNvPr id="5" name="Sous-titre 2">
+            <a:extLst>
+              <a:ext uri="{FF2B5EF4-FFF2-40B4-BE49-F238E27FC236}">
+                <a16:creationId xmlns:a16="http://schemas.microsoft.com/office/drawing/2014/main" id="{4AEB98C6-1EF7-9E29-48EC-46A3EE2A5547}"/>
+              </a:ext>
+            </a:extLst>
+          </p:cNvPr>
+          <p:cNvSpPr txBox="1">
+            <a:spLocks/>
+          </p:cNvSpPr>
+          <p:nvPr/>
+        </p:nvSpPr>
+        <p:spPr>
+          <a:xfrm>
+            <a:off x="9096399" y="6576442"/>
+            <a:ext cx="3095601" cy="281558"/>
+          </a:xfrm>
+          <a:prstGeom prst="rect">
+            <a:avLst/>
+          </a:prstGeom>
+        </p:spPr>
+        <p:txBody>
+          <a:bodyPr vert="horz" lIns="91440" tIns="45720" rIns="91440" bIns="45720" rtlCol="0">
+            <a:normAutofit fontScale="85000" lnSpcReduction="20000"/>
+          </a:bodyPr>
+          <a:lstStyle>
+            <a:lvl1pPr marL="0" indent="0" algn="r" defTabSz="914400" rtl="0" eaLnBrk="1" latinLnBrk="0" hangingPunct="1">
+              <a:lnSpc>
+                <a:spcPct val="90000"/>
+              </a:lnSpc>
+              <a:spcBef>
+                <a:spcPts val="1000"/>
+              </a:spcBef>
+              <a:buFont typeface="Arial" panose="020B0604020202020204" pitchFamily="34" charset="0"/>
+              <a:buNone/>
+              <a:defRPr sz="2000" kern="1200">
+                <a:solidFill>
+                  <a:schemeClr val="tx1"/>
+                </a:solidFill>
+                <a:latin typeface="+mn-lt"/>
+                <a:ea typeface="+mn-ea"/>
+                <a:cs typeface="+mn-cs"/>
+              </a:defRPr>
+            </a:lvl1pPr>
+            <a:lvl2pPr marL="457200" indent="0" algn="ctr" defTabSz="914400" rtl="0" eaLnBrk="1" latinLnBrk="0" hangingPunct="1">
+              <a:lnSpc>
+                <a:spcPct val="90000"/>
+              </a:lnSpc>
+              <a:spcBef>
+                <a:spcPts val="500"/>
+              </a:spcBef>
+              <a:buFont typeface="Arial" panose="020B0604020202020204" pitchFamily="34" charset="0"/>
+              <a:buNone/>
+              <a:defRPr sz="2000" kern="1200">
+                <a:solidFill>
+                  <a:schemeClr val="tx1"/>
+                </a:solidFill>
+                <a:latin typeface="+mn-lt"/>
+                <a:ea typeface="+mn-ea"/>
+                <a:cs typeface="+mn-cs"/>
+              </a:defRPr>
+            </a:lvl2pPr>
+            <a:lvl3pPr marL="914400" indent="0" algn="ctr" defTabSz="914400" rtl="0" eaLnBrk="1" latinLnBrk="0" hangingPunct="1">
+              <a:lnSpc>
+                <a:spcPct val="90000"/>
+              </a:lnSpc>
+              <a:spcBef>
+                <a:spcPts val="500"/>
+              </a:spcBef>
+              <a:buFont typeface="Arial" panose="020B0604020202020204" pitchFamily="34" charset="0"/>
+              <a:buNone/>
+              <a:defRPr sz="1800" kern="1200">
+                <a:solidFill>
+                  <a:schemeClr val="tx1"/>
+                </a:solidFill>
+                <a:latin typeface="+mn-lt"/>
+                <a:ea typeface="+mn-ea"/>
+                <a:cs typeface="+mn-cs"/>
+              </a:defRPr>
+            </a:lvl3pPr>
+            <a:lvl4pPr marL="1371600" indent="0" algn="ctr" defTabSz="914400" rtl="0" eaLnBrk="1" latinLnBrk="0" hangingPunct="1">
+              <a:lnSpc>
+                <a:spcPct val="90000"/>
+              </a:lnSpc>
+              <a:spcBef>
+                <a:spcPts val="500"/>
+              </a:spcBef>
+              <a:buFont typeface="Arial" panose="020B0604020202020204" pitchFamily="34" charset="0"/>
+              <a:buNone/>
+              <a:defRPr sz="1600" kern="1200">
+                <a:solidFill>
+                  <a:schemeClr val="tx1"/>
+                </a:solidFill>
+                <a:latin typeface="+mn-lt"/>
+                <a:ea typeface="+mn-ea"/>
+                <a:cs typeface="+mn-cs"/>
+              </a:defRPr>
+            </a:lvl4pPr>
+            <a:lvl5pPr marL="1828800" indent="0" algn="ctr" defTabSz="914400" rtl="0" eaLnBrk="1" latinLnBrk="0" hangingPunct="1">
+              <a:lnSpc>
+                <a:spcPct val="90000"/>
+              </a:lnSpc>
+              <a:spcBef>
+                <a:spcPts val="500"/>
+              </a:spcBef>
+              <a:buFont typeface="Arial" panose="020B0604020202020204" pitchFamily="34" charset="0"/>
+              <a:buNone/>
+              <a:defRPr sz="1600" kern="1200">
+                <a:solidFill>
+                  <a:schemeClr val="tx1"/>
+                </a:solidFill>
+                <a:latin typeface="+mn-lt"/>
+                <a:ea typeface="+mn-ea"/>
+                <a:cs typeface="+mn-cs"/>
+              </a:defRPr>
+            </a:lvl5pPr>
+            <a:lvl6pPr marL="2286000" indent="0" algn="ctr" defTabSz="914400" rtl="0" eaLnBrk="1" latinLnBrk="0" hangingPunct="1">
+              <a:lnSpc>
+                <a:spcPct val="90000"/>
+              </a:lnSpc>
+              <a:spcBef>
+                <a:spcPts val="500"/>
+              </a:spcBef>
+              <a:buFont typeface="Arial" panose="020B0604020202020204" pitchFamily="34" charset="0"/>
+              <a:buNone/>
+              <a:defRPr sz="1600" kern="1200">
+                <a:solidFill>
+                  <a:schemeClr val="tx1"/>
+                </a:solidFill>
+                <a:latin typeface="+mn-lt"/>
+                <a:ea typeface="+mn-ea"/>
+                <a:cs typeface="+mn-cs"/>
+              </a:defRPr>
+            </a:lvl6pPr>
+            <a:lvl7pPr marL="2743200" indent="0" algn="ctr" defTabSz="914400" rtl="0" eaLnBrk="1" latinLnBrk="0" hangingPunct="1">
+              <a:lnSpc>
+                <a:spcPct val="90000"/>
+              </a:lnSpc>
+              <a:spcBef>
+                <a:spcPts val="500"/>
+              </a:spcBef>
+              <a:buFont typeface="Arial" panose="020B0604020202020204" pitchFamily="34" charset="0"/>
+              <a:buNone/>
+              <a:defRPr sz="1600" kern="1200">
+                <a:solidFill>
+                  <a:schemeClr val="tx1"/>
+                </a:solidFill>
+                <a:latin typeface="+mn-lt"/>
+                <a:ea typeface="+mn-ea"/>
+                <a:cs typeface="+mn-cs"/>
+              </a:defRPr>
+            </a:lvl7pPr>
+            <a:lvl8pPr marL="3200400" indent="0" algn="ctr" defTabSz="914400" rtl="0" eaLnBrk="1" latinLnBrk="0" hangingPunct="1">
+              <a:lnSpc>
+                <a:spcPct val="90000"/>
+              </a:lnSpc>
+              <a:spcBef>
+                <a:spcPts val="500"/>
+              </a:spcBef>
+              <a:buFont typeface="Arial" panose="020B0604020202020204" pitchFamily="34" charset="0"/>
+              <a:buNone/>
+              <a:defRPr sz="1600" kern="1200">
+                <a:solidFill>
+                  <a:schemeClr val="tx1"/>
+                </a:solidFill>
+                <a:latin typeface="+mn-lt"/>
+                <a:ea typeface="+mn-ea"/>
+                <a:cs typeface="+mn-cs"/>
+              </a:defRPr>
+            </a:lvl8pPr>
+            <a:lvl9pPr marL="3657600" indent="0" algn="ctr" defTabSz="914400" rtl="0" eaLnBrk="1" latinLnBrk="0" hangingPunct="1">
+              <a:lnSpc>
+                <a:spcPct val="90000"/>
+              </a:lnSpc>
+              <a:spcBef>
+                <a:spcPts val="500"/>
+              </a:spcBef>
+              <a:buFont typeface="Arial" panose="020B0604020202020204" pitchFamily="34" charset="0"/>
+              <a:buNone/>
+              <a:defRPr sz="1600" kern="1200">
+                <a:solidFill>
+                  <a:schemeClr val="tx1"/>
+                </a:solidFill>
+                <a:latin typeface="+mn-lt"/>
+                <a:ea typeface="+mn-ea"/>
+                <a:cs typeface="+mn-cs"/>
+              </a:defRPr>
+            </a:lvl9pPr>
+          </a:lstStyle>
+          <a:p>
+            <a:pPr algn="l"/>
+            <a:r>
+              <a:rPr lang="fr-CH" dirty="0"/>
+              <a:t>Thibaud Racine - Module i183 </a:t>
+            </a:r>
+          </a:p>
+        </p:txBody>
+      </p:sp>
+    </p:spTree>
+    <p:extLst>
+      <p:ext uri="{BB962C8B-B14F-4D97-AF65-F5344CB8AC3E}">
+        <p14:creationId xmlns:p14="http://schemas.microsoft.com/office/powerpoint/2010/main" val="1201003793"/>
       </p:ext>
     </p:extLst>
   </p:cSld>

</xml_diff>